<commit_message>
Added StringConversionPhase for SCF (default values)
</commit_message>
<xml_diff>
--- a/Frogger Support Files/Compiler Overview.pptx
+++ b/Frogger Support Files/Compiler Overview.pptx
@@ -247,7 +247,7 @@
           <a:p>
             <a:fld id="{3BF98F9D-9F9C-40AF-BCCB-66EA560710A8}" type="datetimeFigureOut">
               <a:rPr lang="en-US" smtClean="0"/>
-              <a:t>8/30/2017</a:t>
+              <a:t>9/1/2017</a:t>
             </a:fld>
             <a:endParaRPr lang="en-US"/>
           </a:p>
@@ -417,7 +417,7 @@
           <a:p>
             <a:fld id="{3BF98F9D-9F9C-40AF-BCCB-66EA560710A8}" type="datetimeFigureOut">
               <a:rPr lang="en-US" smtClean="0"/>
-              <a:t>8/30/2017</a:t>
+              <a:t>9/1/2017</a:t>
             </a:fld>
             <a:endParaRPr lang="en-US"/>
           </a:p>
@@ -597,7 +597,7 @@
           <a:p>
             <a:fld id="{3BF98F9D-9F9C-40AF-BCCB-66EA560710A8}" type="datetimeFigureOut">
               <a:rPr lang="en-US" smtClean="0"/>
-              <a:t>8/30/2017</a:t>
+              <a:t>9/1/2017</a:t>
             </a:fld>
             <a:endParaRPr lang="en-US"/>
           </a:p>
@@ -767,7 +767,7 @@
           <a:p>
             <a:fld id="{3BF98F9D-9F9C-40AF-BCCB-66EA560710A8}" type="datetimeFigureOut">
               <a:rPr lang="en-US" smtClean="0"/>
-              <a:t>8/30/2017</a:t>
+              <a:t>9/1/2017</a:t>
             </a:fld>
             <a:endParaRPr lang="en-US"/>
           </a:p>
@@ -1013,7 +1013,7 @@
           <a:p>
             <a:fld id="{3BF98F9D-9F9C-40AF-BCCB-66EA560710A8}" type="datetimeFigureOut">
               <a:rPr lang="en-US" smtClean="0"/>
-              <a:t>8/30/2017</a:t>
+              <a:t>9/1/2017</a:t>
             </a:fld>
             <a:endParaRPr lang="en-US"/>
           </a:p>
@@ -1245,7 +1245,7 @@
           <a:p>
             <a:fld id="{3BF98F9D-9F9C-40AF-BCCB-66EA560710A8}" type="datetimeFigureOut">
               <a:rPr lang="en-US" smtClean="0"/>
-              <a:t>8/30/2017</a:t>
+              <a:t>9/1/2017</a:t>
             </a:fld>
             <a:endParaRPr lang="en-US"/>
           </a:p>
@@ -1612,7 +1612,7 @@
           <a:p>
             <a:fld id="{3BF98F9D-9F9C-40AF-BCCB-66EA560710A8}" type="datetimeFigureOut">
               <a:rPr lang="en-US" smtClean="0"/>
-              <a:t>8/30/2017</a:t>
+              <a:t>9/1/2017</a:t>
             </a:fld>
             <a:endParaRPr lang="en-US"/>
           </a:p>
@@ -1730,7 +1730,7 @@
           <a:p>
             <a:fld id="{3BF98F9D-9F9C-40AF-BCCB-66EA560710A8}" type="datetimeFigureOut">
               <a:rPr lang="en-US" smtClean="0"/>
-              <a:t>8/30/2017</a:t>
+              <a:t>9/1/2017</a:t>
             </a:fld>
             <a:endParaRPr lang="en-US"/>
           </a:p>
@@ -1825,7 +1825,7 @@
           <a:p>
             <a:fld id="{3BF98F9D-9F9C-40AF-BCCB-66EA560710A8}" type="datetimeFigureOut">
               <a:rPr lang="en-US" smtClean="0"/>
-              <a:t>8/30/2017</a:t>
+              <a:t>9/1/2017</a:t>
             </a:fld>
             <a:endParaRPr lang="en-US"/>
           </a:p>
@@ -2102,7 +2102,7 @@
           <a:p>
             <a:fld id="{3BF98F9D-9F9C-40AF-BCCB-66EA560710A8}" type="datetimeFigureOut">
               <a:rPr lang="en-US" smtClean="0"/>
-              <a:t>8/30/2017</a:t>
+              <a:t>9/1/2017</a:t>
             </a:fld>
             <a:endParaRPr lang="en-US"/>
           </a:p>
@@ -2355,7 +2355,7 @@
           <a:p>
             <a:fld id="{3BF98F9D-9F9C-40AF-BCCB-66EA560710A8}" type="datetimeFigureOut">
               <a:rPr lang="en-US" smtClean="0"/>
-              <a:t>8/30/2017</a:t>
+              <a:t>9/1/2017</a:t>
             </a:fld>
             <a:endParaRPr lang="en-US"/>
           </a:p>
@@ -2568,7 +2568,7 @@
           <a:p>
             <a:fld id="{3BF98F9D-9F9C-40AF-BCCB-66EA560710A8}" type="datetimeFigureOut">
               <a:rPr lang="en-US" smtClean="0"/>
-              <a:t>8/30/2017</a:t>
+              <a:t>9/1/2017</a:t>
             </a:fld>
             <a:endParaRPr lang="en-US"/>
           </a:p>
@@ -4888,7 +4888,7 @@
         </p:nvSpPr>
         <p:spPr>
           <a:xfrm>
-            <a:off x="8497279" y="2186448"/>
+            <a:off x="10352580" y="2199700"/>
             <a:ext cx="1408668" cy="313038"/>
           </a:xfrm>
           <a:prstGeom prst="rect">
@@ -5020,9 +5020,9 @@
           <p:nvPr/>
         </p:nvCxnSpPr>
         <p:spPr>
-          <a:xfrm flipV="1">
-            <a:off x="8010903" y="2342967"/>
-            <a:ext cx="486376" cy="10780"/>
+          <a:xfrm>
+            <a:off x="9866204" y="2353747"/>
+            <a:ext cx="486376" cy="2472"/>
           </a:xfrm>
           <a:prstGeom prst="straightConnector1">
             <a:avLst/>
@@ -5087,7 +5087,7 @@
         </p:nvSpPr>
         <p:spPr>
           <a:xfrm>
-            <a:off x="9873403" y="2384613"/>
+            <a:off x="11354726" y="2529556"/>
             <a:ext cx="813043" cy="246221"/>
           </a:xfrm>
           <a:prstGeom prst="rect">
@@ -5252,7 +5252,7 @@
         </p:nvSpPr>
         <p:spPr>
           <a:xfrm>
-            <a:off x="1753013" y="1893135"/>
+            <a:off x="1753013" y="1906387"/>
             <a:ext cx="1653279" cy="897924"/>
           </a:xfrm>
           <a:prstGeom prst="rect">
@@ -5304,7 +5304,7 @@
         </p:nvSpPr>
         <p:spPr>
           <a:xfrm>
-            <a:off x="4047291" y="2052291"/>
+            <a:off x="5902592" y="2065543"/>
             <a:ext cx="1653279" cy="587587"/>
           </a:xfrm>
           <a:prstGeom prst="rect">
@@ -5391,15 +5391,15 @@
         <p:nvCxnSpPr>
           <p:cNvPr id="47" name="Straight Arrow Connector 46"/>
           <p:cNvCxnSpPr>
-            <a:stCxn id="42" idx="3"/>
+            <a:stCxn id="55" idx="3"/>
             <a:endCxn id="43" idx="1"/>
           </p:cNvCxnSpPr>
           <p:nvPr/>
         </p:nvCxnSpPr>
         <p:spPr>
           <a:xfrm>
-            <a:off x="3406292" y="2342097"/>
-            <a:ext cx="640999" cy="3988"/>
+            <a:off x="5481775" y="2355947"/>
+            <a:ext cx="420817" cy="3390"/>
           </a:xfrm>
           <a:prstGeom prst="straightConnector1">
             <a:avLst/>
@@ -5438,12 +5438,12 @@
         <p:spPr>
           <a:xfrm flipH="1">
             <a:off x="1753013" y="1223319"/>
-            <a:ext cx="7330797" cy="1118778"/>
+            <a:ext cx="7330797" cy="1132030"/>
           </a:xfrm>
           <a:prstGeom prst="bentConnector5">
             <a:avLst>
               <a:gd name="adj1" fmla="val -3118"/>
-              <a:gd name="adj2" fmla="val 43373"/>
+              <a:gd name="adj2" fmla="val 43451"/>
               <a:gd name="adj3" fmla="val 103118"/>
             </a:avLst>
           </a:prstGeom>
@@ -5479,8 +5479,8 @@
         </p:nvCxnSpPr>
         <p:spPr>
           <a:xfrm flipV="1">
-            <a:off x="9905947" y="2339629"/>
-            <a:ext cx="885610" cy="3338"/>
+            <a:off x="11761248" y="2355349"/>
+            <a:ext cx="244611" cy="870"/>
           </a:xfrm>
           <a:prstGeom prst="straightConnector1">
             <a:avLst/>
@@ -5622,12 +5622,12 @@
         </p:nvCxnSpPr>
         <p:spPr>
           <a:xfrm rot="5400000">
-            <a:off x="1305518" y="2243418"/>
-            <a:ext cx="726494" cy="1821777"/>
+            <a:off x="1312144" y="2250044"/>
+            <a:ext cx="713242" cy="1821777"/>
           </a:xfrm>
           <a:prstGeom prst="bentConnector4">
             <a:avLst>
-              <a:gd name="adj1" fmla="val 31857"/>
+              <a:gd name="adj1" fmla="val 31520"/>
               <a:gd name="adj2" fmla="val 112548"/>
             </a:avLst>
           </a:prstGeom>
@@ -5703,13 +5703,13 @@
         </p:nvCxnSpPr>
         <p:spPr>
           <a:xfrm flipH="1" flipV="1">
-            <a:off x="2579653" y="2791059"/>
-            <a:ext cx="1399218" cy="726494"/>
+            <a:off x="2579653" y="2804311"/>
+            <a:ext cx="1399218" cy="713242"/>
           </a:xfrm>
           <a:prstGeom prst="bentConnector4">
             <a:avLst>
               <a:gd name="adj1" fmla="val -16338"/>
-              <a:gd name="adj2" fmla="val 68143"/>
+              <a:gd name="adj2" fmla="val 68480"/>
             </a:avLst>
           </a:prstGeom>
           <a:ln>
@@ -5866,7 +5866,7 @@
         </p:nvSpPr>
         <p:spPr>
           <a:xfrm>
-            <a:off x="4784124" y="3246729"/>
+            <a:off x="6639425" y="3246729"/>
             <a:ext cx="1521283" cy="575738"/>
           </a:xfrm>
           <a:prstGeom prst="rect">
@@ -5921,12 +5921,12 @@
         </p:nvCxnSpPr>
         <p:spPr>
           <a:xfrm rot="5400000">
-            <a:off x="4381668" y="3042335"/>
-            <a:ext cx="894720" cy="89807"/>
+            <a:off x="6243595" y="3048961"/>
+            <a:ext cx="881468" cy="89807"/>
           </a:xfrm>
           <a:prstGeom prst="bentConnector4">
             <a:avLst>
-              <a:gd name="adj1" fmla="val 33913"/>
+              <a:gd name="adj1" fmla="val 33671"/>
               <a:gd name="adj2" fmla="val 354546"/>
             </a:avLst>
           </a:prstGeom>
@@ -5963,13 +5963,13 @@
         </p:nvCxnSpPr>
         <p:spPr>
           <a:xfrm flipH="1" flipV="1">
-            <a:off x="4873931" y="2639878"/>
-            <a:ext cx="1431476" cy="894720"/>
+            <a:off x="6729232" y="2653130"/>
+            <a:ext cx="1431476" cy="881468"/>
           </a:xfrm>
           <a:prstGeom prst="bentConnector4">
             <a:avLst>
               <a:gd name="adj1" fmla="val -15970"/>
-              <a:gd name="adj2" fmla="val 66087"/>
+              <a:gd name="adj2" fmla="val 66329"/>
             </a:avLst>
           </a:prstGeom>
           <a:ln>
@@ -6002,7 +6002,7 @@
         </p:nvSpPr>
         <p:spPr>
           <a:xfrm>
-            <a:off x="4529320" y="2907627"/>
+            <a:off x="6384621" y="2907627"/>
             <a:ext cx="380232" cy="246221"/>
           </a:xfrm>
           <a:prstGeom prst="rect">
@@ -6032,7 +6032,7 @@
         </p:nvSpPr>
         <p:spPr>
           <a:xfrm>
-            <a:off x="5097135" y="2903314"/>
+            <a:off x="6952436" y="2903314"/>
             <a:ext cx="380232" cy="246221"/>
           </a:xfrm>
           <a:prstGeom prst="rect">
@@ -6062,7 +6062,7 @@
         </p:nvSpPr>
         <p:spPr>
           <a:xfrm>
-            <a:off x="4609470" y="2749247"/>
+            <a:off x="6464771" y="2749247"/>
             <a:ext cx="300082" cy="369332"/>
           </a:xfrm>
           <a:prstGeom prst="rect">
@@ -6248,7 +6248,7 @@
         </p:nvSpPr>
         <p:spPr>
           <a:xfrm>
-            <a:off x="7009741" y="5121803"/>
+            <a:off x="5431759" y="5126275"/>
             <a:ext cx="1408668" cy="313038"/>
           </a:xfrm>
           <a:prstGeom prst="rect">
@@ -6374,15 +6374,15 @@
         <p:nvCxnSpPr>
           <p:cNvPr id="91" name="Straight Arrow Connector 90"/>
           <p:cNvCxnSpPr>
-            <a:stCxn id="110" idx="3"/>
+            <a:stCxn id="87" idx="3"/>
             <a:endCxn id="88" idx="1"/>
           </p:cNvCxnSpPr>
           <p:nvPr/>
         </p:nvCxnSpPr>
         <p:spPr>
           <a:xfrm>
-            <a:off x="6643772" y="5278322"/>
-            <a:ext cx="365969" cy="0"/>
+            <a:off x="5025032" y="5280979"/>
+            <a:ext cx="406727" cy="1815"/>
           </a:xfrm>
           <a:prstGeom prst="straightConnector1">
             <a:avLst/>
@@ -6441,104 +6441,13 @@
       </p:sp>
       <p:sp>
         <p:nvSpPr>
-          <p:cNvPr id="110" name="Rectangle 109"/>
-          <p:cNvSpPr/>
-          <p:nvPr/>
-        </p:nvSpPr>
-        <p:spPr>
-          <a:xfrm>
-            <a:off x="5288648" y="4831347"/>
-            <a:ext cx="1355124" cy="893949"/>
-          </a:xfrm>
-          <a:prstGeom prst="rect">
-            <a:avLst/>
-          </a:prstGeom>
-        </p:spPr>
-        <p:style>
-          <a:lnRef idx="2">
-            <a:schemeClr val="accent6">
-              <a:shade val="50000"/>
-            </a:schemeClr>
-          </a:lnRef>
-          <a:fillRef idx="1">
-            <a:schemeClr val="accent6"/>
-          </a:fillRef>
-          <a:effectRef idx="0">
-            <a:schemeClr val="accent6"/>
-          </a:effectRef>
-          <a:fontRef idx="minor">
-            <a:schemeClr val="lt1"/>
-          </a:fontRef>
-        </p:style>
-        <p:txBody>
-          <a:bodyPr rtlCol="0" anchor="ctr"/>
-          <a:lstStyle/>
-          <a:p>
-            <a:pPr algn="ctr"/>
-            <a:r>
-              <a:rPr lang="en-US" dirty="0" smtClean="0">
-                <a:solidFill>
-                  <a:schemeClr val="tx1"/>
-                </a:solidFill>
-              </a:rPr>
-              <a:t>String Conversion Phase</a:t>
-            </a:r>
-            <a:endParaRPr lang="en-US" dirty="0">
-              <a:solidFill>
-                <a:schemeClr val="tx1"/>
-              </a:solidFill>
-            </a:endParaRPr>
-          </a:p>
-        </p:txBody>
-      </p:sp>
-      <p:cxnSp>
-        <p:nvCxnSpPr>
-          <p:cNvPr id="111" name="Straight Arrow Connector 110"/>
-          <p:cNvCxnSpPr>
-            <a:stCxn id="87" idx="3"/>
-            <a:endCxn id="110" idx="1"/>
-          </p:cNvCxnSpPr>
-          <p:nvPr/>
-        </p:nvCxnSpPr>
-        <p:spPr>
-          <a:xfrm flipV="1">
-            <a:off x="5025032" y="5278322"/>
-            <a:ext cx="263616" cy="2657"/>
-          </a:xfrm>
-          <a:prstGeom prst="straightConnector1">
-            <a:avLst/>
-          </a:prstGeom>
-          <a:ln>
-            <a:solidFill>
-              <a:schemeClr val="tx1"/>
-            </a:solidFill>
-            <a:tailEnd type="triangle"/>
-          </a:ln>
-        </p:spPr>
-        <p:style>
-          <a:lnRef idx="1">
-            <a:schemeClr val="accent1"/>
-          </a:lnRef>
-          <a:fillRef idx="0">
-            <a:schemeClr val="accent1"/>
-          </a:fillRef>
-          <a:effectRef idx="0">
-            <a:schemeClr val="accent1"/>
-          </a:effectRef>
-          <a:fontRef idx="minor">
-            <a:schemeClr val="tx1"/>
-          </a:fontRef>
-        </p:style>
-      </p:cxnSp>
-      <p:sp>
-        <p:nvSpPr>
           <p:cNvPr id="81" name="Rectangle 80"/>
           <p:cNvSpPr/>
           <p:nvPr/>
         </p:nvSpPr>
         <p:spPr>
           <a:xfrm>
-            <a:off x="6357624" y="1966575"/>
+            <a:off x="8212925" y="1966575"/>
             <a:ext cx="1653279" cy="774343"/>
           </a:xfrm>
           <a:prstGeom prst="rect">
@@ -6592,9 +6501,9 @@
           <p:nvPr/>
         </p:nvCxnSpPr>
         <p:spPr>
-          <a:xfrm>
-            <a:off x="5700570" y="2346085"/>
-            <a:ext cx="657054" cy="7662"/>
+          <a:xfrm flipV="1">
+            <a:off x="7555871" y="2353747"/>
+            <a:ext cx="657054" cy="5590"/>
           </a:xfrm>
           <a:prstGeom prst="straightConnector1">
             <a:avLst/>
@@ -6629,7 +6538,7 @@
         </p:nvSpPr>
         <p:spPr>
           <a:xfrm>
-            <a:off x="7094457" y="3153848"/>
+            <a:off x="8949758" y="3153848"/>
             <a:ext cx="1521283" cy="847752"/>
           </a:xfrm>
           <a:prstGeom prst="rect">
@@ -6684,7 +6593,7 @@
         </p:nvCxnSpPr>
         <p:spPr>
           <a:xfrm rot="5400000">
-            <a:off x="6720958" y="3114418"/>
+            <a:off x="8576259" y="3114418"/>
             <a:ext cx="836806" cy="89807"/>
           </a:xfrm>
           <a:prstGeom prst="bentConnector4">
@@ -6726,7 +6635,7 @@
         </p:nvCxnSpPr>
         <p:spPr>
           <a:xfrm flipH="1" flipV="1">
-            <a:off x="7184264" y="2740918"/>
+            <a:off x="9039565" y="2740918"/>
             <a:ext cx="1431476" cy="836806"/>
           </a:xfrm>
           <a:prstGeom prst="bentConnector4">
@@ -6765,7 +6674,7 @@
         </p:nvSpPr>
         <p:spPr>
           <a:xfrm>
-            <a:off x="6839653" y="2903639"/>
+            <a:off x="8694954" y="2903639"/>
             <a:ext cx="380232" cy="246221"/>
           </a:xfrm>
           <a:prstGeom prst="rect">
@@ -6795,7 +6704,7 @@
         </p:nvSpPr>
         <p:spPr>
           <a:xfrm>
-            <a:off x="7407468" y="2899326"/>
+            <a:off x="9262769" y="2899326"/>
             <a:ext cx="380232" cy="246221"/>
           </a:xfrm>
           <a:prstGeom prst="rect">
@@ -6825,7 +6734,340 @@
         </p:nvSpPr>
         <p:spPr>
           <a:xfrm>
-            <a:off x="6919803" y="2745259"/>
+            <a:off x="8775104" y="2745259"/>
+            <a:ext cx="300082" cy="369332"/>
+          </a:xfrm>
+          <a:prstGeom prst="rect">
+            <a:avLst/>
+          </a:prstGeom>
+          <a:noFill/>
+        </p:spPr>
+        <p:txBody>
+          <a:bodyPr wrap="none" rtlCol="0">
+            <a:spAutoFit/>
+          </a:bodyPr>
+          <a:lstStyle/>
+          <a:p>
+            <a:r>
+              <a:rPr lang="en-US" dirty="0" smtClean="0"/>
+              <a:t>*</a:t>
+            </a:r>
+            <a:endParaRPr lang="en-US" dirty="0"/>
+          </a:p>
+        </p:txBody>
+      </p:sp>
+      <p:sp>
+        <p:nvSpPr>
+          <p:cNvPr id="55" name="Rectangle 54"/>
+          <p:cNvSpPr/>
+          <p:nvPr/>
+        </p:nvSpPr>
+        <p:spPr>
+          <a:xfrm>
+            <a:off x="3828496" y="1970975"/>
+            <a:ext cx="1653279" cy="769943"/>
+          </a:xfrm>
+          <a:prstGeom prst="rect">
+            <a:avLst/>
+          </a:prstGeom>
+        </p:spPr>
+        <p:style>
+          <a:lnRef idx="2">
+            <a:schemeClr val="accent6">
+              <a:shade val="50000"/>
+            </a:schemeClr>
+          </a:lnRef>
+          <a:fillRef idx="1">
+            <a:schemeClr val="accent6"/>
+          </a:fillRef>
+          <a:effectRef idx="0">
+            <a:schemeClr val="accent6"/>
+          </a:effectRef>
+          <a:fontRef idx="minor">
+            <a:schemeClr val="lt1"/>
+          </a:fontRef>
+        </p:style>
+        <p:txBody>
+          <a:bodyPr rtlCol="0" anchor="ctr"/>
+          <a:lstStyle/>
+          <a:p>
+            <a:pPr algn="ctr"/>
+            <a:r>
+              <a:rPr lang="en-US" dirty="0" smtClean="0">
+                <a:solidFill>
+                  <a:schemeClr val="tx1"/>
+                </a:solidFill>
+              </a:rPr>
+              <a:t>String Conversion Phase </a:t>
+            </a:r>
+            <a:r>
+              <a:rPr lang="en-US" dirty="0" smtClean="0">
+                <a:solidFill>
+                  <a:schemeClr val="tx1"/>
+                </a:solidFill>
+              </a:rPr>
+              <a:t>(SCF)</a:t>
+            </a:r>
+            <a:endParaRPr lang="en-US" dirty="0">
+              <a:solidFill>
+                <a:schemeClr val="tx1"/>
+              </a:solidFill>
+            </a:endParaRPr>
+          </a:p>
+        </p:txBody>
+      </p:sp>
+      <p:cxnSp>
+        <p:nvCxnSpPr>
+          <p:cNvPr id="56" name="Straight Arrow Connector 55"/>
+          <p:cNvCxnSpPr>
+            <a:stCxn id="42" idx="3"/>
+            <a:endCxn id="55" idx="1"/>
+          </p:cNvCxnSpPr>
+          <p:nvPr/>
+        </p:nvCxnSpPr>
+        <p:spPr>
+          <a:xfrm>
+            <a:off x="3406292" y="2355349"/>
+            <a:ext cx="422204" cy="598"/>
+          </a:xfrm>
+          <a:prstGeom prst="straightConnector1">
+            <a:avLst/>
+          </a:prstGeom>
+          <a:ln>
+            <a:solidFill>
+              <a:schemeClr val="tx1"/>
+            </a:solidFill>
+            <a:tailEnd type="triangle"/>
+          </a:ln>
+        </p:spPr>
+        <p:style>
+          <a:lnRef idx="1">
+            <a:schemeClr val="accent1"/>
+          </a:lnRef>
+          <a:fillRef idx="0">
+            <a:schemeClr val="accent1"/>
+          </a:fillRef>
+          <a:effectRef idx="0">
+            <a:schemeClr val="accent1"/>
+          </a:effectRef>
+          <a:fontRef idx="minor">
+            <a:schemeClr val="tx1"/>
+          </a:fontRef>
+        </p:style>
+      </p:cxnSp>
+      <p:sp>
+        <p:nvSpPr>
+          <p:cNvPr id="59" name="Rectangle 58"/>
+          <p:cNvSpPr/>
+          <p:nvPr/>
+        </p:nvSpPr>
+        <p:spPr>
+          <a:xfrm>
+            <a:off x="4565329" y="3153434"/>
+            <a:ext cx="1521283" cy="848166"/>
+          </a:xfrm>
+          <a:prstGeom prst="rect">
+            <a:avLst/>
+          </a:prstGeom>
+        </p:spPr>
+        <p:style>
+          <a:lnRef idx="2">
+            <a:schemeClr val="accent6">
+              <a:shade val="50000"/>
+            </a:schemeClr>
+          </a:lnRef>
+          <a:fillRef idx="1">
+            <a:schemeClr val="accent6"/>
+          </a:fillRef>
+          <a:effectRef idx="0">
+            <a:schemeClr val="accent6"/>
+          </a:effectRef>
+          <a:fontRef idx="minor">
+            <a:schemeClr val="lt1"/>
+          </a:fontRef>
+        </p:style>
+        <p:txBody>
+          <a:bodyPr rtlCol="0" anchor="ctr"/>
+          <a:lstStyle/>
+          <a:p>
+            <a:pPr algn="ctr"/>
+            <a:r>
+              <a:rPr lang="en-US" dirty="0" smtClean="0">
+                <a:solidFill>
+                  <a:schemeClr val="tx1"/>
+                </a:solidFill>
+              </a:rPr>
+              <a:t>String Conversion Phase </a:t>
+            </a:r>
+            <a:r>
+              <a:rPr lang="en-US" dirty="0" smtClean="0">
+                <a:solidFill>
+                  <a:schemeClr val="tx1"/>
+                </a:solidFill>
+              </a:rPr>
+              <a:t>(FGR)</a:t>
+            </a:r>
+            <a:endParaRPr lang="en-US" dirty="0">
+              <a:solidFill>
+                <a:schemeClr val="tx1"/>
+              </a:solidFill>
+            </a:endParaRPr>
+          </a:p>
+        </p:txBody>
+      </p:sp>
+      <p:cxnSp>
+        <p:nvCxnSpPr>
+          <p:cNvPr id="63" name="Straight Arrow Connector 74"/>
+          <p:cNvCxnSpPr>
+            <a:stCxn id="55" idx="2"/>
+            <a:endCxn id="59" idx="1"/>
+          </p:cNvCxnSpPr>
+          <p:nvPr/>
+        </p:nvCxnSpPr>
+        <p:spPr>
+          <a:xfrm rot="5400000">
+            <a:off x="4191934" y="3114314"/>
+            <a:ext cx="836599" cy="89807"/>
+          </a:xfrm>
+          <a:prstGeom prst="bentConnector4">
+            <a:avLst>
+              <a:gd name="adj1" fmla="val 24654"/>
+              <a:gd name="adj2" fmla="val 354546"/>
+            </a:avLst>
+          </a:prstGeom>
+          <a:ln>
+            <a:solidFill>
+              <a:schemeClr val="tx1"/>
+            </a:solidFill>
+            <a:tailEnd type="triangle"/>
+          </a:ln>
+        </p:spPr>
+        <p:style>
+          <a:lnRef idx="1">
+            <a:schemeClr val="accent1"/>
+          </a:lnRef>
+          <a:fillRef idx="0">
+            <a:schemeClr val="accent1"/>
+          </a:fillRef>
+          <a:effectRef idx="0">
+            <a:schemeClr val="accent1"/>
+          </a:effectRef>
+          <a:fontRef idx="minor">
+            <a:schemeClr val="tx1"/>
+          </a:fontRef>
+        </p:style>
+      </p:cxnSp>
+      <p:cxnSp>
+        <p:nvCxnSpPr>
+          <p:cNvPr id="64" name="Straight Arrow Connector 76"/>
+          <p:cNvCxnSpPr>
+            <a:stCxn id="59" idx="3"/>
+            <a:endCxn id="55" idx="2"/>
+          </p:cNvCxnSpPr>
+          <p:nvPr/>
+        </p:nvCxnSpPr>
+        <p:spPr>
+          <a:xfrm flipH="1" flipV="1">
+            <a:off x="4655136" y="2740918"/>
+            <a:ext cx="1431476" cy="836599"/>
+          </a:xfrm>
+          <a:prstGeom prst="bentConnector4">
+            <a:avLst>
+              <a:gd name="adj1" fmla="val -15970"/>
+              <a:gd name="adj2" fmla="val 75346"/>
+            </a:avLst>
+          </a:prstGeom>
+          <a:ln>
+            <a:solidFill>
+              <a:schemeClr val="tx1"/>
+            </a:solidFill>
+            <a:tailEnd type="triangle"/>
+          </a:ln>
+        </p:spPr>
+        <p:style>
+          <a:lnRef idx="1">
+            <a:schemeClr val="accent1"/>
+          </a:lnRef>
+          <a:fillRef idx="0">
+            <a:schemeClr val="accent1"/>
+          </a:fillRef>
+          <a:effectRef idx="0">
+            <a:schemeClr val="accent1"/>
+          </a:effectRef>
+          <a:fontRef idx="minor">
+            <a:schemeClr val="tx1"/>
+          </a:fontRef>
+        </p:style>
+      </p:cxnSp>
+      <p:sp>
+        <p:nvSpPr>
+          <p:cNvPr id="65" name="TextBox 64"/>
+          <p:cNvSpPr txBox="1"/>
+          <p:nvPr/>
+        </p:nvSpPr>
+        <p:spPr>
+          <a:xfrm>
+            <a:off x="4310525" y="2911525"/>
+            <a:ext cx="380232" cy="246221"/>
+          </a:xfrm>
+          <a:prstGeom prst="rect">
+            <a:avLst/>
+          </a:prstGeom>
+          <a:noFill/>
+        </p:spPr>
+        <p:txBody>
+          <a:bodyPr wrap="none" rtlCol="0">
+            <a:spAutoFit/>
+          </a:bodyPr>
+          <a:lstStyle/>
+          <a:p>
+            <a:r>
+              <a:rPr lang="en-US" sz="1000" dirty="0" smtClean="0"/>
+              <a:t>AST</a:t>
+            </a:r>
+            <a:endParaRPr lang="en-US" sz="1000" dirty="0"/>
+          </a:p>
+        </p:txBody>
+      </p:sp>
+      <p:sp>
+        <p:nvSpPr>
+          <p:cNvPr id="66" name="TextBox 65"/>
+          <p:cNvSpPr txBox="1"/>
+          <p:nvPr/>
+        </p:nvSpPr>
+        <p:spPr>
+          <a:xfrm>
+            <a:off x="4878340" y="2907212"/>
+            <a:ext cx="380232" cy="246221"/>
+          </a:xfrm>
+          <a:prstGeom prst="rect">
+            <a:avLst/>
+          </a:prstGeom>
+          <a:noFill/>
+        </p:spPr>
+        <p:txBody>
+          <a:bodyPr wrap="none" rtlCol="0">
+            <a:spAutoFit/>
+          </a:bodyPr>
+          <a:lstStyle/>
+          <a:p>
+            <a:r>
+              <a:rPr lang="en-US" sz="1000" dirty="0" smtClean="0"/>
+              <a:t>AST</a:t>
+            </a:r>
+            <a:endParaRPr lang="en-US" sz="1000" dirty="0"/>
+          </a:p>
+        </p:txBody>
+      </p:sp>
+      <p:sp>
+        <p:nvSpPr>
+          <p:cNvPr id="67" name="TextBox 66"/>
+          <p:cNvSpPr txBox="1"/>
+          <p:nvPr/>
+        </p:nvSpPr>
+        <p:spPr>
+          <a:xfrm>
+            <a:off x="4390675" y="2753145"/>
             <a:ext cx="300082" cy="369332"/>
           </a:xfrm>
           <a:prstGeom prst="rect">
@@ -8014,11 +8256,7 @@
           <a:p>
             <a:r>
               <a:rPr lang="en-US" sz="1000" dirty="0" smtClean="0"/>
-              <a:t>&lt;ITL&gt; </a:t>
-            </a:r>
-            <a:r>
-              <a:rPr lang="en-US" sz="1000" dirty="0" smtClean="0"/>
-              <a:t>Text</a:t>
+              <a:t>&lt;ITL&gt; Text</a:t>
             </a:r>
             <a:endParaRPr lang="en-US" sz="1000" dirty="0"/>
           </a:p>

</xml_diff>